<commit_message>
One to One Relationship ( Debugbar & Telescope )
</commit_message>
<xml_diff>
--- a/.lessons/17 Fundamental Database - Eloquent ORM/11 Factory/1.pptx
+++ b/.lessons/17 Fundamental Database - Eloquent ORM/11 Factory/1.pptx
@@ -7,6 +7,7 @@
   <p:sldIdLst>
     <p:sldId id="402" r:id="rId2"/>
     <p:sldId id="403" r:id="rId3"/>
+    <p:sldId id="404" r:id="rId4"/>
   </p:sldIdLst>
   <p:sldSz cx="12192000" cy="6858000"/>
   <p:notesSz cx="6858000" cy="9144000"/>
@@ -3536,10 +3537,126 @@
           </a:p>
         </p:txBody>
       </p:sp>
+      <p:pic>
+        <p:nvPicPr>
+          <p:cNvPr id="4" name="Picture 3">
+            <a:extLst>
+              <a:ext uri="{FF2B5EF4-FFF2-40B4-BE49-F238E27FC236}">
+                <a16:creationId xmlns:a16="http://schemas.microsoft.com/office/drawing/2014/main" id="{E3149633-2041-A63F-D546-A391EA656772}"/>
+              </a:ext>
+            </a:extLst>
+          </p:cNvPr>
+          <p:cNvPicPr>
+            <a:picLocks noChangeAspect="1"/>
+          </p:cNvPicPr>
+          <p:nvPr/>
+        </p:nvPicPr>
+        <p:blipFill>
+          <a:blip r:embed="rId2"/>
+          <a:stretch>
+            <a:fillRect/>
+          </a:stretch>
+        </p:blipFill>
+        <p:spPr>
+          <a:xfrm>
+            <a:off x="0" y="502765"/>
+            <a:ext cx="12192000" cy="5852469"/>
+          </a:xfrm>
+          <a:prstGeom prst="rect">
+            <a:avLst/>
+          </a:prstGeom>
+        </p:spPr>
+      </p:pic>
     </p:spTree>
     <p:extLst>
       <p:ext uri="{BB962C8B-B14F-4D97-AF65-F5344CB8AC3E}">
         <p14:creationId xmlns:p14="http://schemas.microsoft.com/office/powerpoint/2010/main" val="425524760"/>
+      </p:ext>
+    </p:extLst>
+  </p:cSld>
+  <p:clrMapOvr>
+    <a:masterClrMapping/>
+  </p:clrMapOvr>
+</p:sld>
+</file>
+
+<file path=ppt/slides/slide3.xml><?xml version="1.0" encoding="utf-8"?>
+<p:sld xmlns:a="http://schemas.openxmlformats.org/drawingml/2006/main" xmlns:r="http://schemas.openxmlformats.org/officeDocument/2006/relationships" xmlns:p="http://schemas.openxmlformats.org/presentationml/2006/main">
+  <p:cSld>
+    <p:spTree>
+      <p:nvGrpSpPr>
+        <p:cNvPr id="1" name="">
+          <a:extLst>
+            <a:ext uri="{FF2B5EF4-FFF2-40B4-BE49-F238E27FC236}">
+              <a16:creationId xmlns:a16="http://schemas.microsoft.com/office/drawing/2014/main" id="{7B755299-E5B4-A9AA-904A-F53D114836B1}"/>
+            </a:ext>
+          </a:extLst>
+        </p:cNvPr>
+        <p:cNvGrpSpPr/>
+        <p:nvPr/>
+      </p:nvGrpSpPr>
+      <p:grpSpPr>
+        <a:xfrm>
+          <a:off x="0" y="0"/>
+          <a:ext cx="0" cy="0"/>
+          <a:chOff x="0" y="0"/>
+          <a:chExt cx="0" cy="0"/>
+        </a:xfrm>
+      </p:grpSpPr>
+      <p:sp>
+        <p:nvSpPr>
+          <p:cNvPr id="3" name="TextBox 2">
+            <a:extLst>
+              <a:ext uri="{FF2B5EF4-FFF2-40B4-BE49-F238E27FC236}">
+                <a16:creationId xmlns:a16="http://schemas.microsoft.com/office/drawing/2014/main" id="{6541AEB7-0BAB-B4EB-FEF3-5E988D4101D9}"/>
+              </a:ext>
+            </a:extLst>
+          </p:cNvPr>
+          <p:cNvSpPr txBox="1"/>
+          <p:nvPr/>
+        </p:nvSpPr>
+        <p:spPr>
+          <a:xfrm>
+            <a:off x="217714" y="255046"/>
+            <a:ext cx="11756571" cy="355354"/>
+          </a:xfrm>
+          <a:prstGeom prst="rect">
+            <a:avLst/>
+          </a:prstGeom>
+          <a:noFill/>
+        </p:spPr>
+        <p:txBody>
+          <a:bodyPr wrap="square">
+            <a:spAutoFit/>
+          </a:bodyPr>
+          <a:lstStyle/>
+          <a:p>
+            <a:pPr>
+              <a:lnSpc>
+                <a:spcPct val="150000"/>
+              </a:lnSpc>
+              <a:buNone/>
+            </a:pPr>
+            <a:r>
+              <a:rPr kumimoji="0" lang="en-US" altLang="en-US" sz="1300" b="0" i="0" u="none" strike="noStrike" cap="none" normalizeH="0" baseline="0">
+                <a:ln>
+                  <a:noFill/>
+                </a:ln>
+                <a:solidFill>
+                  <a:schemeClr val="tx1"/>
+                </a:solidFill>
+                <a:effectLst/>
+                <a:latin typeface="Arial" panose="020B0604020202020204" pitchFamily="34" charset="0"/>
+              </a:rPr>
+              <a:t>.</a:t>
+            </a:r>
+          </a:p>
+        </p:txBody>
+      </p:sp>
+    </p:spTree>
+    <p:extLst>
+      <p:ext uri="{BB962C8B-B14F-4D97-AF65-F5344CB8AC3E}">
+        <p14:creationId xmlns:p14="http://schemas.microsoft.com/office/powerpoint/2010/main" val="2347750590"/>
       </p:ext>
     </p:extLst>
   </p:cSld>

</xml_diff>